<commit_message>
Added time portion to slideshow
</commit_message>
<xml_diff>
--- a/DataQuest 2024 - Team 15.pptx
+++ b/DataQuest 2024 - Team 15.pptx
@@ -5054,14 +5054,26 @@
               <a:rPr lang="en-US" dirty="0">
                 <a:latin typeface="Georgia Pro"/>
               </a:rPr>
-              <a:t>[precision</a:t>
-            </a:r>
-            <a:r>
-              <a:rPr lang="en-US">
-                <a:latin typeface="Georgia Pro"/>
-              </a:rPr>
-              <a:t>] - 94.9%</a:t>
-            </a:r>
+              <a:t>[precision] - 94.9%</a:t>
+            </a:r>
+          </a:p>
+          <a:p>
+            <a:r>
+              <a:rPr lang="en-US" dirty="0">
+                <a:latin typeface="Georgia Pro"/>
+              </a:rPr>
+              <a:t>[recall] - 82.6%</a:t>
+            </a:r>
+          </a:p>
+          <a:p>
+            <a:r>
+              <a:rPr lang="en-US" dirty="0">
+                <a:latin typeface="Georgia Pro"/>
+              </a:rPr>
+              <a:t>[f1 score] - 88.3%</a:t>
+            </a:r>
+          </a:p>
+          <a:p>
             <a:endParaRPr lang="en-US" dirty="0">
               <a:latin typeface="Georgia Pro"/>
             </a:endParaRPr>
@@ -5071,7 +5083,7 @@
               <a:rPr lang="en-US" dirty="0">
                 <a:latin typeface="Georgia Pro"/>
               </a:rPr>
-              <a:t>[recall] - 82.6%</a:t>
+              <a:t>The first run of a dataset can take a significantly long time</a:t>
             </a:r>
           </a:p>
           <a:p>
@@ -5079,33 +5091,17 @@
               <a:rPr lang="en-US" dirty="0">
                 <a:latin typeface="Georgia Pro"/>
               </a:rPr>
-              <a:t>[f1 score] - 88.3%</a:t>
-            </a:r>
-          </a:p>
-          <a:p>
-            <a:endParaRPr lang="en-US">
+              <a:t>Future runs of </a:t>
+            </a:r>
+            <a:r>
+              <a:rPr lang="en-US">
+                <a:latin typeface="Georgia Pro"/>
+              </a:rPr>
+              <a:t>datasets take only minutes</a:t>
+            </a:r>
+            <a:endParaRPr lang="en-US" dirty="0">
               <a:latin typeface="Georgia Pro"/>
             </a:endParaRPr>
-          </a:p>
-          <a:p>
-            <a:r>
-              <a:rPr lang="en-US" dirty="0">
-                <a:latin typeface="Georgia Pro"/>
-              </a:rPr>
-              <a:t>It took </a:t>
-            </a:r>
-            <a:r>
-              <a:rPr lang="en-US" b="1" dirty="0">
-                <a:latin typeface="Georgia Pro"/>
-              </a:rPr>
-              <a:t>[time]</a:t>
-            </a:r>
-            <a:r>
-              <a:rPr lang="en-US" dirty="0">
-                <a:latin typeface="Georgia Pro"/>
-              </a:rPr>
-              <a:t> to train the model and make predictions</a:t>
-            </a:r>
           </a:p>
           <a:p>
             <a:r>
@@ -5482,6 +5478,23 @@
 </file>
 
 <file path=customXml/item1.xml><?xml version="1.0" encoding="utf-8"?>
+<p:properties xmlns:p="http://schemas.microsoft.com/office/2006/metadata/properties" xmlns:xsi="http://www.w3.org/2001/XMLSchema-instance" xmlns:pc="http://schemas.microsoft.com/office/infopath/2007/PartnerControls">
+  <documentManagement>
+    <_activity xmlns="2653e083-c695-4870-a406-9d75d66c5eca" xsi:nil="true"/>
+  </documentManagement>
+</p:properties>
+</file>
+
+<file path=customXml/item2.xml><?xml version="1.0" encoding="utf-8"?>
+<?mso-contentType ?>
+<FormTemplates xmlns="http://schemas.microsoft.com/sharepoint/v3/contenttype/forms">
+  <Display>DocumentLibraryForm</Display>
+  <Edit>DocumentLibraryForm</Edit>
+  <New>DocumentLibraryForm</New>
+</FormTemplates>
+</file>
+
+<file path=customXml/item3.xml><?xml version="1.0" encoding="utf-8"?>
 <ct:contentTypeSchema xmlns:ct="http://schemas.microsoft.com/office/2006/metadata/contentType" xmlns:ma="http://schemas.microsoft.com/office/2006/metadata/properties/metaAttributes" ct:_="" ma:_="" ma:contentTypeName="Document" ma:contentTypeID="0x0101004D2AF3C206D2C04C9E0C8A71A64B0A1E" ma:contentTypeVersion="14" ma:contentTypeDescription="Create a new document." ma:contentTypeScope="" ma:versionID="794681e2db40ebe8a871e3a4ff241940">
   <xsd:schema xmlns:xsd="http://www.w3.org/2001/XMLSchema" xmlns:xs="http://www.w3.org/2001/XMLSchema" xmlns:p="http://schemas.microsoft.com/office/2006/metadata/properties" xmlns:ns3="2653e083-c695-4870-a406-9d75d66c5eca" xmlns:ns4="2cfb336b-596f-4449-9b4e-ca250c119221" targetNamespace="http://schemas.microsoft.com/office/2006/metadata/properties" ma:root="true" ma:fieldsID="d0e95a175b057e4dd2dc0ca5178981e0" ns3:_="" ns4:_="">
     <xsd:import namespace="2653e083-c695-4870-a406-9d75d66c5eca"/>
@@ -5708,24 +5721,32 @@
 </ct:contentTypeSchema>
 </file>
 
-<file path=customXml/item2.xml><?xml version="1.0" encoding="utf-8"?>
-<?mso-contentType ?>
-<FormTemplates xmlns="http://schemas.microsoft.com/sharepoint/v3/contenttype/forms">
-  <Display>DocumentLibraryForm</Display>
-  <Edit>DocumentLibraryForm</Edit>
-  <New>DocumentLibraryForm</New>
-</FormTemplates>
+<file path=customXml/itemProps1.xml><?xml version="1.0" encoding="utf-8"?>
+<ds:datastoreItem xmlns:ds="http://schemas.openxmlformats.org/officeDocument/2006/customXml" ds:itemID="{1A03032B-A66B-4302-9CFE-F6AD02FFF130}">
+  <ds:schemaRefs>
+    <ds:schemaRef ds:uri="2653e083-c695-4870-a406-9d75d66c5eca"/>
+    <ds:schemaRef ds:uri="2cfb336b-596f-4449-9b4e-ca250c119221"/>
+    <ds:schemaRef ds:uri="http://purl.org/dc/dcmitype/"/>
+    <ds:schemaRef ds:uri="http://purl.org/dc/elements/1.1/"/>
+    <ds:schemaRef ds:uri="http://purl.org/dc/terms/"/>
+    <ds:schemaRef ds:uri="http://schemas.microsoft.com/office/2006/documentManagement/types"/>
+    <ds:schemaRef ds:uri="http://schemas.microsoft.com/office/2006/metadata/properties"/>
+    <ds:schemaRef ds:uri="http://schemas.microsoft.com/office/infopath/2007/PartnerControls"/>
+    <ds:schemaRef ds:uri="http://schemas.openxmlformats.org/package/2006/metadata/core-properties"/>
+    <ds:schemaRef ds:uri="http://www.w3.org/XML/1998/namespace"/>
+  </ds:schemaRefs>
+</ds:datastoreItem>
 </file>
 
-<file path=customXml/item3.xml><?xml version="1.0" encoding="utf-8"?>
-<p:properties xmlns:p="http://schemas.microsoft.com/office/2006/metadata/properties" xmlns:xsi="http://www.w3.org/2001/XMLSchema-instance" xmlns:pc="http://schemas.microsoft.com/office/infopath/2007/PartnerControls">
-  <documentManagement>
-    <_activity xmlns="2653e083-c695-4870-a406-9d75d66c5eca" xsi:nil="true"/>
-  </documentManagement>
-</p:properties>
+<file path=customXml/itemProps2.xml><?xml version="1.0" encoding="utf-8"?>
+<ds:datastoreItem xmlns:ds="http://schemas.openxmlformats.org/officeDocument/2006/customXml" ds:itemID="{2CBE1C1F-486B-42FB-B82C-93B4C663BA02}">
+  <ds:schemaRefs>
+    <ds:schemaRef ds:uri="http://schemas.microsoft.com/sharepoint/v3/contenttype/forms"/>
+  </ds:schemaRefs>
+</ds:datastoreItem>
 </file>
 
-<file path=customXml/itemProps1.xml><?xml version="1.0" encoding="utf-8"?>
+<file path=customXml/itemProps3.xml><?xml version="1.0" encoding="utf-8"?>
 <ds:datastoreItem xmlns:ds="http://schemas.openxmlformats.org/officeDocument/2006/customXml" ds:itemID="{4DCF8B65-376B-4A48-BBDF-B8A5BF8BE3F4}">
   <ds:schemaRefs>
     <ds:schemaRef ds:uri="2653e083-c695-4870-a406-9d75d66c5eca"/>
@@ -5742,29 +5763,4 @@
     <ds:schemaRef ds:uri="http://www.w3.org/2001/XMLSchema"/>
   </ds:schemaRefs>
 </ds:datastoreItem>
-</file>
-
-<file path=customXml/itemProps2.xml><?xml version="1.0" encoding="utf-8"?>
-<ds:datastoreItem xmlns:ds="http://schemas.openxmlformats.org/officeDocument/2006/customXml" ds:itemID="{2CBE1C1F-486B-42FB-B82C-93B4C663BA02}">
-  <ds:schemaRefs>
-    <ds:schemaRef ds:uri="http://schemas.microsoft.com/sharepoint/v3/contenttype/forms"/>
-  </ds:schemaRefs>
-</ds:datastoreItem>
-</file>
-
-<file path=customXml/itemProps3.xml><?xml version="1.0" encoding="utf-8"?>
-<ds:datastoreItem xmlns:ds="http://schemas.openxmlformats.org/officeDocument/2006/customXml" ds:itemID="{1A03032B-A66B-4302-9CFE-F6AD02FFF130}">
-  <ds:schemaRefs>
-    <ds:schemaRef ds:uri="2653e083-c695-4870-a406-9d75d66c5eca"/>
-    <ds:schemaRef ds:uri="2cfb336b-596f-4449-9b4e-ca250c119221"/>
-    <ds:schemaRef ds:uri="http://purl.org/dc/dcmitype/"/>
-    <ds:schemaRef ds:uri="http://purl.org/dc/elements/1.1/"/>
-    <ds:schemaRef ds:uri="http://purl.org/dc/terms/"/>
-    <ds:schemaRef ds:uri="http://schemas.microsoft.com/office/2006/documentManagement/types"/>
-    <ds:schemaRef ds:uri="http://schemas.microsoft.com/office/2006/metadata/properties"/>
-    <ds:schemaRef ds:uri="http://schemas.microsoft.com/office/infopath/2007/PartnerControls"/>
-    <ds:schemaRef ds:uri="http://schemas.openxmlformats.org/package/2006/metadata/core-properties"/>
-    <ds:schemaRef ds:uri="http://www.w3.org/XML/1998/namespace"/>
-  </ds:schemaRefs>
-</ds:datastoreItem>
 </file>
</xml_diff>